<commit_message>
Điều chỉnh bài 13,14,18
</commit_message>
<xml_diff>
--- a/Bai 13 Cai dat VSM.pptx
+++ b/Bai 13 Cai dat VSM.pptx
@@ -179,7 +179,7 @@
   </p:defaultTextStyle>
   <p:extLst>
     <p:ext uri="{EFAFB233-063F-42B5-8137-9DF3F51BA10A}">
-      <p15:sldGuideLst xmlns:p15="http://schemas.microsoft.com/office/powerpoint/2012/main" xmlns="">
+      <p15:sldGuideLst xmlns="" xmlns:p15="http://schemas.microsoft.com/office/powerpoint/2012/main">
         <p15:guide id="1" orient="horz" pos="2160">
           <p15:clr>
             <a:srgbClr val="A4A3A4"/>
@@ -42828,19 +42828,7 @@
               <a:rPr lang="vi-VN" sz="2800" smtClean="0">
                 <a:ea typeface="ＭＳ Ｐゴシック" panose="020B0600070205080204" pitchFamily="34" charset="-128"/>
               </a:rPr>
-              <a:t>lượng </a:t>
-            </a:r>
-            <a:r>
-              <a:rPr lang="vi-VN" sz="2800" smtClean="0">
-                <a:ea typeface="ＭＳ Ｐゴシック" panose="020B0600070205080204" pitchFamily="34" charset="-128"/>
-              </a:rPr>
-              <a:t>ưu tiên</a:t>
-            </a:r>
-            <a:r>
-              <a:rPr lang="vi-VN" sz="2800" smtClean="0">
-                <a:ea typeface="ＭＳ Ｐゴシック" panose="020B0600070205080204" pitchFamily="34" charset="-128"/>
-              </a:rPr>
-              <a:t> </a:t>
+              <a:t>lượng ưu tiên </a:t>
             </a:r>
             <a:r>
               <a:rPr lang="vi-VN" sz="2800" dirty="0" smtClean="0">
@@ -42852,19 +42840,7 @@
               <a:rPr lang="vi-VN" sz="2800" smtClean="0">
                 <a:ea typeface="ＭＳ Ｐゴシック" panose="020B0600070205080204" pitchFamily="34" charset="-128"/>
               </a:rPr>
-              <a:t>lượng </a:t>
-            </a:r>
-            <a:r>
-              <a:rPr lang="vi-VN" sz="2800" smtClean="0">
-                <a:ea typeface="ＭＳ Ｐゴシック" panose="020B0600070205080204" pitchFamily="34" charset="-128"/>
-              </a:rPr>
-              <a:t>ưu tiên</a:t>
-            </a:r>
-            <a:r>
-              <a:rPr lang="vi-VN" sz="2800" smtClean="0">
-                <a:ea typeface="ＭＳ Ｐゴシック" panose="020B0600070205080204" pitchFamily="34" charset="-128"/>
-              </a:rPr>
-              <a:t> </a:t>
+              <a:t>lượng ưu tiên </a:t>
             </a:r>
             <a:r>
               <a:rPr lang="vi-VN" sz="2800" dirty="0" smtClean="0">
@@ -42876,19 +42852,7 @@
               <a:rPr lang="vi-VN" sz="2800" smtClean="0">
                 <a:ea typeface="ＭＳ Ｐゴシック" panose="020B0600070205080204" pitchFamily="34" charset="-128"/>
               </a:rPr>
-              <a:t>tf </a:t>
-            </a:r>
-            <a:r>
-              <a:rPr lang="vi-VN" sz="2800" smtClean="0">
-                <a:ea typeface="ＭＳ Ｐゴシック" panose="020B0600070205080204" pitchFamily="34" charset="-128"/>
-              </a:rPr>
-              <a:t>đã </a:t>
-            </a:r>
-            <a:r>
-              <a:rPr lang="vi-VN" sz="2800" smtClean="0">
-                <a:ea typeface="ＭＳ Ｐゴシック" panose="020B0600070205080204" pitchFamily="34" charset="-128"/>
-              </a:rPr>
-              <a:t>chuẩn </a:t>
+              <a:t>tf đã chuẩn </a:t>
             </a:r>
             <a:r>
               <a:rPr lang="vi-VN" sz="2800" dirty="0" smtClean="0">
@@ -42900,13 +42864,7 @@
               <a:rPr lang="vi-VN" sz="2800" smtClean="0">
                 <a:ea typeface="ＭＳ Ｐゴシック" panose="020B0600070205080204" pitchFamily="34" charset="-128"/>
               </a:rPr>
-              <a:t>Euclid </a:t>
-            </a:r>
-            <a:r>
-              <a:rPr lang="vi-VN" sz="2800" smtClean="0">
-                <a:ea typeface="ＭＳ Ｐゴシック" panose="020B0600070205080204" pitchFamily="34" charset="-128"/>
-              </a:rPr>
-              <a:t>(chuẩn hóa Euclid là tên gọi khác của chuẩn </a:t>
+              <a:t>Euclid (chuẩn hóa Euclid là tên gọi khác của chuẩn </a:t>
             </a:r>
             <a:r>
               <a:rPr lang="vi-VN" sz="2800" dirty="0" smtClean="0">
@@ -43425,13 +43383,7 @@
               <a:rPr lang="vi-VN" sz="3600" smtClean="0">
                 <a:ea typeface="ＭＳ Ｐゴシック" panose="020B0600070205080204" pitchFamily="34" charset="-128"/>
               </a:rPr>
-              <a:t>Bài tập </a:t>
-            </a:r>
-            <a:r>
-              <a:rPr lang="vi-VN" sz="3600" smtClean="0">
-                <a:ea typeface="ＭＳ Ｐゴシック" panose="020B0600070205080204" pitchFamily="34" charset="-128"/>
-              </a:rPr>
-              <a:t>13.2</a:t>
+              <a:t>Bài tập 13.2</a:t>
             </a:r>
             <a:endParaRPr lang="vi-VN" sz="3600" dirty="0" smtClean="0">
               <a:ea typeface="ＭＳ Ｐゴシック" panose="020B0600070205080204" pitchFamily="34" charset="-128"/>
@@ -44345,13 +44297,7 @@
               <a:rPr lang="vi-VN" sz="3600" smtClean="0">
                 <a:ea typeface="ＭＳ Ｐゴシック" panose="020B0600070205080204" pitchFamily="34" charset="-128"/>
               </a:rPr>
-              <a:t>Bài tập </a:t>
-            </a:r>
-            <a:r>
-              <a:rPr lang="vi-VN" sz="3600" smtClean="0">
-                <a:ea typeface="ＭＳ Ｐゴシック" panose="020B0600070205080204" pitchFamily="34" charset="-128"/>
-              </a:rPr>
-              <a:t>13.3</a:t>
+              <a:t>Bài tập 13.3</a:t>
             </a:r>
             <a:endParaRPr lang="vi-VN" sz="3600" dirty="0" smtClean="0">
               <a:ea typeface="ＭＳ Ｐゴシック" panose="020B0600070205080204" pitchFamily="34" charset="-128"/>
@@ -44942,6 +44888,30 @@
           <a:chExt cx="0" cy="0"/>
         </a:xfrm>
       </p:grpSpPr>
+      <p:pic>
+        <p:nvPicPr>
+          <p:cNvPr id="10" name="Picture 9" descr="733.png"/>
+          <p:cNvPicPr>
+            <a:picLocks noChangeAspect="1"/>
+          </p:cNvPicPr>
+          <p:nvPr/>
+        </p:nvPicPr>
+        <p:blipFill>
+          <a:blip r:embed="rId3"/>
+          <a:stretch>
+            <a:fillRect/>
+          </a:stretch>
+        </p:blipFill>
+        <p:spPr>
+          <a:xfrm>
+            <a:off x="3491880" y="3717032"/>
+            <a:ext cx="4213151" cy="3141016"/>
+          </a:xfrm>
+          <a:prstGeom prst="rect">
+            <a:avLst/>
+          </a:prstGeom>
+        </p:spPr>
+      </p:pic>
       <p:sp>
         <p:nvSpPr>
           <p:cNvPr id="84995" name="Text Box 2"/>
@@ -45112,8 +45082,8 @@
         </p:nvSpPr>
         <p:spPr bwMode="auto">
           <a:xfrm>
-            <a:off x="467543" y="1801340"/>
-            <a:ext cx="8393229" cy="3571876"/>
+            <a:off x="467543" y="1916832"/>
+            <a:ext cx="8393229" cy="3067820"/>
           </a:xfrm>
           <a:prstGeom prst="rect">
             <a:avLst/>
@@ -45449,30 +45419,6 @@
           </a:p>
         </p:txBody>
       </p:sp>
-      <p:pic>
-        <p:nvPicPr>
-          <p:cNvPr id="10" name="Picture 9" descr="733.png"/>
-          <p:cNvPicPr>
-            <a:picLocks noChangeAspect="1"/>
-          </p:cNvPicPr>
-          <p:nvPr/>
-        </p:nvPicPr>
-        <p:blipFill>
-          <a:blip r:embed="rId3"/>
-          <a:stretch>
-            <a:fillRect/>
-          </a:stretch>
-        </p:blipFill>
-        <p:spPr>
-          <a:xfrm>
-            <a:off x="3491880" y="3716984"/>
-            <a:ext cx="4213151" cy="3141016"/>
-          </a:xfrm>
-          <a:prstGeom prst="rect">
-            <a:avLst/>
-          </a:prstGeom>
-        </p:spPr>
-      </p:pic>
       <p:sp>
         <p:nvSpPr>
           <p:cNvPr id="2" name="TextBox 1"/>
@@ -48227,7 +48173,7 @@
   </a:extraClrSchemeLst>
   <a:extLst>
     <a:ext uri="{05A4C25C-085E-4340-85A3-A5531E510DB2}">
-      <thm15:themeFamily xmlns:thm15="http://schemas.microsoft.com/office/thememl/2012/main" xmlns="" name="Office Theme" id="{62F939B6-93AF-4DB8-9C6B-D6C7DFDC589F}" vid="{4A3C46E8-61CC-4603-A589-7422A47A8E4A}"/>
+      <thm15:themeFamily xmlns="" xmlns:thm15="http://schemas.microsoft.com/office/thememl/2012/main" name="Office Theme" id="{62F939B6-93AF-4DB8-9C6B-D6C7DFDC589F}" vid="{4A3C46E8-61CC-4603-A589-7422A47A8E4A}"/>
     </a:ext>
   </a:extLst>
 </a:theme>
@@ -48276,7 +48222,7 @@
     </a:clrScheme>
     <a:fontScheme name="Office">
       <a:majorFont>
-        <a:latin typeface="Calibri Light" panose="020F0302020204030204"/>
+        <a:latin typeface="Calibri Light"/>
         <a:ea typeface=""/>
         <a:cs typeface=""/>
         <a:font script="Jpan" typeface="ＭＳ Ｐゴシック"/>
@@ -48311,7 +48257,7 @@
         <a:font script="Geor" typeface="Sylfaen"/>
       </a:majorFont>
       <a:minorFont>
-        <a:latin typeface="Calibri" panose="020F0502020204030204"/>
+        <a:latin typeface="Calibri"/>
         <a:ea typeface=""/>
         <a:cs typeface=""/>
         <a:font script="Jpan" typeface="ＭＳ Ｐゴシック"/>
@@ -48488,7 +48434,7 @@
   <a:extraClrSchemeLst/>
   <a:extLst>
     <a:ext uri="{05A4C25C-085E-4340-85A3-A5531E510DB2}">
-      <thm15:themeFamily xmlns:thm15="http://schemas.microsoft.com/office/thememl/2012/main" xmlns="" name="Office Theme" id="{62F939B6-93AF-4DB8-9C6B-D6C7DFDC589F}" vid="{4A3C46E8-61CC-4603-A589-7422A47A8E4A}"/>
+      <thm15:themeFamily xmlns="" xmlns:thm15="http://schemas.microsoft.com/office/thememl/2012/main" name="Office Theme" id="{62F939B6-93AF-4DB8-9C6B-D6C7DFDC589F}" vid="{4A3C46E8-61CC-4603-A589-7422A47A8E4A}"/>
     </a:ext>
   </a:extLst>
 </a:theme>

</xml_diff>

<commit_message>
Cập nhật bài giảng (hiệu chỉnh nhỏ)
</commit_message>
<xml_diff>
--- a/Bai 13 Cai dat VSM.pptx
+++ b/Bai 13 Cai dat VSM.pptx
@@ -179,7 +179,7 @@
   </p:defaultTextStyle>
   <p:extLst>
     <p:ext uri="{EFAFB233-063F-42B5-8137-9DF3F51BA10A}">
-      <p15:sldGuideLst xmlns="" xmlns:p15="http://schemas.microsoft.com/office/powerpoint/2012/main">
+      <p15:sldGuideLst xmlns:p15="http://schemas.microsoft.com/office/powerpoint/2012/main" xmlns="">
         <p15:guide id="1" orient="horz" pos="2160">
           <p15:clr>
             <a:srgbClr val="A4A3A4"/>
@@ -1557,6 +1557,102 @@
         </p:txBody>
       </p:sp>
     </p:spTree>
+  </p:cSld>
+  <p:clrMapOvr>
+    <a:masterClrMapping/>
+  </p:clrMapOvr>
+</p:notes>
+</file>
+
+<file path=ppt/notesSlides/notesSlide16.xml><?xml version="1.0" encoding="utf-8"?>
+<p:notes xmlns:a="http://schemas.openxmlformats.org/drawingml/2006/main" xmlns:r="http://schemas.openxmlformats.org/officeDocument/2006/relationships" xmlns:p="http://schemas.openxmlformats.org/presentationml/2006/main">
+  <p:cSld>
+    <p:spTree>
+      <p:nvGrpSpPr>
+        <p:cNvPr id="1" name=""/>
+        <p:cNvGrpSpPr/>
+        <p:nvPr/>
+      </p:nvGrpSpPr>
+      <p:grpSpPr>
+        <a:xfrm>
+          <a:off x="0" y="0"/>
+          <a:ext cx="0" cy="0"/>
+          <a:chOff x="0" y="0"/>
+          <a:chExt cx="0" cy="0"/>
+        </a:xfrm>
+      </p:grpSpPr>
+      <p:sp>
+        <p:nvSpPr>
+          <p:cNvPr id="2" name="Slide Image Placeholder 1"/>
+          <p:cNvSpPr>
+            <a:spLocks noGrp="1" noRot="1" noChangeAspect="1"/>
+          </p:cNvSpPr>
+          <p:nvPr>
+            <p:ph type="sldImg"/>
+          </p:nvPr>
+        </p:nvSpPr>
+        <p:spPr/>
+      </p:sp>
+      <p:sp>
+        <p:nvSpPr>
+          <p:cNvPr id="3" name="Notes Placeholder 2"/>
+          <p:cNvSpPr>
+            <a:spLocks noGrp="1"/>
+          </p:cNvSpPr>
+          <p:nvPr>
+            <p:ph type="body" idx="1"/>
+          </p:nvPr>
+        </p:nvSpPr>
+        <p:spPr/>
+        <p:txBody>
+          <a:bodyPr/>
+          <a:lstStyle/>
+          <a:p>
+            <a:r>
+              <a:rPr lang="vi-VN" sz="1200" smtClean="0">
+                <a:ea typeface="ＭＳ Ｐゴシック" panose="020B0600070205080204" pitchFamily="34" charset="-128"/>
+              </a:rPr>
+              <a:t>chuẩn hóa Euclid là tên gọi khác của chuẩn hóa cosine</a:t>
+            </a:r>
+            <a:endParaRPr lang="vi-VN"/>
+          </a:p>
+        </p:txBody>
+      </p:sp>
+      <p:sp>
+        <p:nvSpPr>
+          <p:cNvPr id="4" name="Slide Number Placeholder 3"/>
+          <p:cNvSpPr>
+            <a:spLocks noGrp="1"/>
+          </p:cNvSpPr>
+          <p:nvPr>
+            <p:ph type="sldNum" sz="quarter" idx="10"/>
+          </p:nvPr>
+        </p:nvSpPr>
+        <p:spPr/>
+        <p:txBody>
+          <a:bodyPr/>
+          <a:lstStyle/>
+          <a:p>
+            <a:pPr>
+              <a:defRPr/>
+            </a:pPr>
+            <a:fld id="{585E8FF7-254D-404A-8133-35E4F866AECA}" type="slidenum">
+              <a:rPr lang="vi-VN" smtClean="0"/>
+              <a:pPr>
+                <a:defRPr/>
+              </a:pPr>
+              <a:t>38</a:t>
+            </a:fld>
+            <a:endParaRPr lang="vi-VN"/>
+          </a:p>
+        </p:txBody>
+      </p:sp>
+    </p:spTree>
+    <p:extLst>
+      <p:ext uri="{BB962C8B-B14F-4D97-AF65-F5344CB8AC3E}">
+        <p14:creationId xmlns:p14="http://schemas.microsoft.com/office/powerpoint/2010/main" val="2283231088"/>
+      </p:ext>
+    </p:extLst>
   </p:cSld>
   <p:clrMapOvr>
     <a:masterClrMapping/>
@@ -42852,25 +42948,13 @@
               <a:rPr lang="vi-VN" sz="2800" smtClean="0">
                 <a:ea typeface="ＭＳ Ｐゴシック" panose="020B0600070205080204" pitchFamily="34" charset="-128"/>
               </a:rPr>
-              <a:t>tf đã chuẩn </a:t>
-            </a:r>
-            <a:r>
-              <a:rPr lang="vi-VN" sz="2800" dirty="0" smtClean="0">
+              <a:t>tf đã chuẩn hóa </a:t>
+            </a:r>
+            <a:r>
+              <a:rPr lang="vi-VN" sz="2800" smtClean="0">
                 <a:ea typeface="ＭＳ Ｐゴシック" panose="020B0600070205080204" pitchFamily="34" charset="-128"/>
               </a:rPr>
-              <a:t>hóa </a:t>
-            </a:r>
-            <a:r>
-              <a:rPr lang="vi-VN" sz="2800" smtClean="0">
-                <a:ea typeface="ＭＳ Ｐゴシック" panose="020B0600070205080204" pitchFamily="34" charset="-128"/>
-              </a:rPr>
-              <a:t>Euclid (chuẩn hóa Euclid là tên gọi khác của chuẩn </a:t>
-            </a:r>
-            <a:r>
-              <a:rPr lang="vi-VN" sz="2800" dirty="0" smtClean="0">
-                <a:ea typeface="ＭＳ Ｐゴシック" panose="020B0600070205080204" pitchFamily="34" charset="-128"/>
-              </a:rPr>
-              <a:t>hóa cosine).</a:t>
+              <a:t>Euclid.</a:t>
             </a:r>
             <a:endParaRPr lang="vi-VN" sz="2800" dirty="0" smtClean="0">
               <a:solidFill>
@@ -43151,7 +43235,7 @@
         </p:nvSpPr>
         <p:spPr>
           <a:xfrm>
-            <a:off x="4696099" y="4360160"/>
+            <a:off x="4696099" y="4030342"/>
             <a:ext cx="3960440" cy="523220"/>
           </a:xfrm>
           <a:prstGeom prst="rect">
@@ -43184,60 +43268,6 @@
       <p:pic>
         <p:nvPicPr>
           <p:cNvPr id="1027" name="Picture 3"/>
-          <p:cNvPicPr>
-            <a:picLocks noChangeAspect="1" noChangeArrowheads="1"/>
-          </p:cNvPicPr>
-          <p:nvPr/>
-        </p:nvPicPr>
-        <p:blipFill>
-          <a:blip r:embed="rId2">
-            <a:extLst>
-              <a:ext uri="{28A0092B-C50C-407E-A947-70E740481C1C}">
-                <a14:useLocalDpi xmlns:a14="http://schemas.microsoft.com/office/drawing/2010/main" val="0"/>
-              </a:ext>
-            </a:extLst>
-          </a:blip>
-          <a:srcRect/>
-          <a:stretch>
-            <a:fillRect/>
-          </a:stretch>
-        </p:blipFill>
-        <p:spPr bwMode="auto">
-          <a:xfrm>
-            <a:off x="4696099" y="4883380"/>
-            <a:ext cx="3960440" cy="1713972"/>
-          </a:xfrm>
-          <a:prstGeom prst="rect">
-            <a:avLst/>
-          </a:prstGeom>
-          <a:noFill/>
-          <a:ln>
-            <a:noFill/>
-          </a:ln>
-          <a:extLst>
-            <a:ext uri="{909E8E84-426E-40DD-AFC4-6F175D3DCCD1}">
-              <a14:hiddenFill xmlns:a14="http://schemas.microsoft.com/office/drawing/2010/main">
-                <a:solidFill>
-                  <a:schemeClr val="accent1"/>
-                </a:solidFill>
-              </a14:hiddenFill>
-            </a:ext>
-            <a:ext uri="{91240B29-F687-4F45-9708-019B960494DF}">
-              <a14:hiddenLine xmlns:a14="http://schemas.microsoft.com/office/drawing/2010/main" w="9525">
-                <a:solidFill>
-                  <a:schemeClr val="tx1"/>
-                </a:solidFill>
-                <a:miter lim="800000"/>
-                <a:headEnd/>
-                <a:tailEnd/>
-              </a14:hiddenLine>
-            </a:ext>
-          </a:extLst>
-        </p:spPr>
-      </p:pic>
-      <p:pic>
-        <p:nvPicPr>
-          <p:cNvPr id="12" name="Picture 4"/>
           <p:cNvPicPr>
             <a:picLocks noChangeAspect="1" noChangeArrowheads="1"/>
           </p:cNvPicPr>
@@ -43258,7 +43288,61 @@
         </p:blipFill>
         <p:spPr bwMode="auto">
           <a:xfrm>
-            <a:off x="723824" y="4951833"/>
+            <a:off x="4696099" y="4553562"/>
+            <a:ext cx="3960440" cy="1713972"/>
+          </a:xfrm>
+          <a:prstGeom prst="rect">
+            <a:avLst/>
+          </a:prstGeom>
+          <a:noFill/>
+          <a:ln>
+            <a:noFill/>
+          </a:ln>
+          <a:extLst>
+            <a:ext uri="{909E8E84-426E-40DD-AFC4-6F175D3DCCD1}">
+              <a14:hiddenFill xmlns:a14="http://schemas.microsoft.com/office/drawing/2010/main">
+                <a:solidFill>
+                  <a:schemeClr val="accent1"/>
+                </a:solidFill>
+              </a14:hiddenFill>
+            </a:ext>
+            <a:ext uri="{91240B29-F687-4F45-9708-019B960494DF}">
+              <a14:hiddenLine xmlns:a14="http://schemas.microsoft.com/office/drawing/2010/main" w="9525">
+                <a:solidFill>
+                  <a:schemeClr val="tx1"/>
+                </a:solidFill>
+                <a:miter lim="800000"/>
+                <a:headEnd/>
+                <a:tailEnd/>
+              </a14:hiddenLine>
+            </a:ext>
+          </a:extLst>
+        </p:spPr>
+      </p:pic>
+      <p:pic>
+        <p:nvPicPr>
+          <p:cNvPr id="12" name="Picture 4"/>
+          <p:cNvPicPr>
+            <a:picLocks noChangeAspect="1" noChangeArrowheads="1"/>
+          </p:cNvPicPr>
+          <p:nvPr/>
+        </p:nvPicPr>
+        <p:blipFill>
+          <a:blip r:embed="rId4">
+            <a:extLst>
+              <a:ext uri="{28A0092B-C50C-407E-A947-70E740481C1C}">
+                <a14:useLocalDpi xmlns:a14="http://schemas.microsoft.com/office/drawing/2010/main" val="0"/>
+              </a:ext>
+            </a:extLst>
+          </a:blip>
+          <a:srcRect/>
+          <a:stretch>
+            <a:fillRect/>
+          </a:stretch>
+        </p:blipFill>
+        <p:spPr bwMode="auto">
+          <a:xfrm>
+            <a:off x="723824" y="4622015"/>
             <a:ext cx="3842001" cy="1577066"/>
           </a:xfrm>
           <a:prstGeom prst="rect">
@@ -43297,7 +43381,7 @@
         </p:nvSpPr>
         <p:spPr>
           <a:xfrm>
-            <a:off x="899592" y="4334882"/>
+            <a:off x="899592" y="4005064"/>
             <a:ext cx="2911326" cy="523220"/>
           </a:xfrm>
           <a:prstGeom prst="rect">
@@ -48173,7 +48257,7 @@
   </a:extraClrSchemeLst>
   <a:extLst>
     <a:ext uri="{05A4C25C-085E-4340-85A3-A5531E510DB2}">
-      <thm15:themeFamily xmlns="" xmlns:thm15="http://schemas.microsoft.com/office/thememl/2012/main" name="Office Theme" id="{62F939B6-93AF-4DB8-9C6B-D6C7DFDC589F}" vid="{4A3C46E8-61CC-4603-A589-7422A47A8E4A}"/>
+      <thm15:themeFamily xmlns:thm15="http://schemas.microsoft.com/office/thememl/2012/main" xmlns="" name="Office Theme" id="{62F939B6-93AF-4DB8-9C6B-D6C7DFDC589F}" vid="{4A3C46E8-61CC-4603-A589-7422A47A8E4A}"/>
     </a:ext>
   </a:extLst>
 </a:theme>
@@ -48434,7 +48518,7 @@
   <a:extraClrSchemeLst/>
   <a:extLst>
     <a:ext uri="{05A4C25C-085E-4340-85A3-A5531E510DB2}">
-      <thm15:themeFamily xmlns="" xmlns:thm15="http://schemas.microsoft.com/office/thememl/2012/main" name="Office Theme" id="{62F939B6-93AF-4DB8-9C6B-D6C7DFDC589F}" vid="{4A3C46E8-61CC-4603-A589-7422A47A8E4A}"/>
+      <thm15:themeFamily xmlns:thm15="http://schemas.microsoft.com/office/thememl/2012/main" xmlns="" name="Office Theme" id="{62F939B6-93AF-4DB8-9C6B-D6C7DFDC589F}" vid="{4A3C46E8-61CC-4603-A589-7422A47A8E4A}"/>
     </a:ext>
   </a:extLst>
 </a:theme>

</xml_diff>